<commit_message>
Added lecture notebooks, powerpoints, and filled notebooks.
</commit_message>
<xml_diff>
--- a/Wi19_content/DSMCER/L3_Descriptive_Statistics.pptx
+++ b/Wi19_content/DSMCER/L3_Descriptive_Statistics.pptx
@@ -246,7 +246,7 @@
           <a:p>
             <a:fld id="{08F62E20-B1AA-3442-B8F1-F4A56998389D}" type="datetimeFigureOut">
               <a:rPr lang="en-US" smtClean="0"/>
-              <a:t>1/10/2019</a:t>
+              <a:t>1/24/2019</a:t>
             </a:fld>
             <a:endParaRPr lang="en-US"/>
           </a:p>
@@ -2234,7 +2234,7 @@
           <a:p>
             <a:fld id="{2691D6E4-0F7A-0249-86EF-226720E50E4C}" type="datetimeFigureOut">
               <a:rPr lang="en-US" smtClean="0"/>
-              <a:t>1/10/2019</a:t>
+              <a:t>1/24/2019</a:t>
             </a:fld>
             <a:endParaRPr lang="en-US"/>
           </a:p>
@@ -2426,7 +2426,7 @@
           <a:p>
             <a:fld id="{2691D6E4-0F7A-0249-86EF-226720E50E4C}" type="datetimeFigureOut">
               <a:rPr lang="en-US" smtClean="0"/>
-              <a:t>1/10/2019</a:t>
+              <a:t>1/24/2019</a:t>
             </a:fld>
             <a:endParaRPr lang="en-US"/>
           </a:p>
@@ -2628,7 +2628,7 @@
           <a:p>
             <a:fld id="{2691D6E4-0F7A-0249-86EF-226720E50E4C}" type="datetimeFigureOut">
               <a:rPr lang="en-US" smtClean="0"/>
-              <a:t>1/10/2019</a:t>
+              <a:t>1/24/2019</a:t>
             </a:fld>
             <a:endParaRPr lang="en-US"/>
           </a:p>
@@ -2820,7 +2820,7 @@
           <a:p>
             <a:fld id="{2691D6E4-0F7A-0249-86EF-226720E50E4C}" type="datetimeFigureOut">
               <a:rPr lang="en-US" smtClean="0"/>
-              <a:t>1/10/2019</a:t>
+              <a:t>1/24/2019</a:t>
             </a:fld>
             <a:endParaRPr lang="en-US"/>
           </a:p>
@@ -3089,7 +3089,7 @@
           <a:p>
             <a:fld id="{2691D6E4-0F7A-0249-86EF-226720E50E4C}" type="datetimeFigureOut">
               <a:rPr lang="en-US" smtClean="0"/>
-              <a:t>1/10/2019</a:t>
+              <a:t>1/24/2019</a:t>
             </a:fld>
             <a:endParaRPr lang="en-US"/>
           </a:p>
@@ -3398,7 +3398,7 @@
           <a:p>
             <a:fld id="{2691D6E4-0F7A-0249-86EF-226720E50E4C}" type="datetimeFigureOut">
               <a:rPr lang="en-US" smtClean="0"/>
-              <a:t>1/10/2019</a:t>
+              <a:t>1/24/2019</a:t>
             </a:fld>
             <a:endParaRPr lang="en-US"/>
           </a:p>
@@ -3841,7 +3841,7 @@
           <a:p>
             <a:fld id="{2691D6E4-0F7A-0249-86EF-226720E50E4C}" type="datetimeFigureOut">
               <a:rPr lang="en-US" smtClean="0"/>
-              <a:t>1/10/2019</a:t>
+              <a:t>1/24/2019</a:t>
             </a:fld>
             <a:endParaRPr lang="en-US"/>
           </a:p>
@@ -3982,7 +3982,7 @@
           <a:p>
             <a:fld id="{2691D6E4-0F7A-0249-86EF-226720E50E4C}" type="datetimeFigureOut">
               <a:rPr lang="en-US" smtClean="0"/>
-              <a:t>1/10/2019</a:t>
+              <a:t>1/24/2019</a:t>
             </a:fld>
             <a:endParaRPr lang="en-US"/>
           </a:p>
@@ -4101,7 +4101,7 @@
           <a:p>
             <a:fld id="{2691D6E4-0F7A-0249-86EF-226720E50E4C}" type="datetimeFigureOut">
               <a:rPr lang="en-US" smtClean="0"/>
-              <a:t>1/10/2019</a:t>
+              <a:t>1/24/2019</a:t>
             </a:fld>
             <a:endParaRPr lang="en-US"/>
           </a:p>
@@ -4400,7 +4400,7 @@
           <a:p>
             <a:fld id="{2691D6E4-0F7A-0249-86EF-226720E50E4C}" type="datetimeFigureOut">
               <a:rPr lang="en-US" smtClean="0"/>
-              <a:t>1/10/2019</a:t>
+              <a:t>1/24/2019</a:t>
             </a:fld>
             <a:endParaRPr lang="en-US"/>
           </a:p>
@@ -4676,7 +4676,7 @@
           <a:p>
             <a:fld id="{2691D6E4-0F7A-0249-86EF-226720E50E4C}" type="datetimeFigureOut">
               <a:rPr lang="en-US" smtClean="0"/>
-              <a:t>1/10/2019</a:t>
+              <a:t>1/24/2019</a:t>
             </a:fld>
             <a:endParaRPr lang="en-US"/>
           </a:p>
@@ -6216,7 +6216,7 @@
         </p:blipFill>
         <p:spPr>
           <a:xfrm>
-            <a:off x="2066441" y="4243300"/>
+            <a:off x="2066441" y="4050764"/>
             <a:ext cx="4572000" cy="2414072"/>
           </a:xfrm>
           <a:prstGeom prst="rect">
@@ -6224,6 +6224,44 @@
           </a:prstGeom>
         </p:spPr>
       </p:pic>
+      <p:sp>
+        <p:nvSpPr>
+          <p:cNvPr id="5" name="Rectangle 4">
+            <a:hlinkClick r:id="rId4"/>
+            <a:extLst>
+              <a:ext uri="{FF2B5EF4-FFF2-40B4-BE49-F238E27FC236}">
+                <a16:creationId xmlns:a16="http://schemas.microsoft.com/office/drawing/2014/main" id="{1E37D66F-92DD-4358-9D8B-07E997CD7713}"/>
+              </a:ext>
+            </a:extLst>
+          </p:cNvPr>
+          <p:cNvSpPr/>
+          <p:nvPr/>
+        </p:nvSpPr>
+        <p:spPr>
+          <a:xfrm>
+            <a:off x="0" y="6488668"/>
+            <a:ext cx="4673074" cy="369332"/>
+          </a:xfrm>
+          <a:prstGeom prst="rect">
+            <a:avLst/>
+          </a:prstGeom>
+        </p:spPr>
+        <p:txBody>
+          <a:bodyPr wrap="none">
+            <a:spAutoFit/>
+          </a:bodyPr>
+          <a:lstStyle/>
+          <a:p>
+            <a:r>
+              <a:rPr lang="en-US">
+                <a:latin typeface="Arial" panose="020B0604020202020204" pitchFamily="34" charset="0"/>
+                <a:cs typeface="Arial" panose="020B0604020202020204" pitchFamily="34" charset="0"/>
+              </a:rPr>
+              <a:t>https://en.wikipedia.org/wiki/Bias_(statistics)</a:t>
+            </a:r>
+          </a:p>
+        </p:txBody>
+      </p:sp>
     </p:spTree>
     <p:extLst>
       <p:ext uri="{BB962C8B-B14F-4D97-AF65-F5344CB8AC3E}">
@@ -6287,6 +6325,51 @@
                       </p:childTnLst>
                     </p:cTn>
                   </p:par>
+                  <p:par>
+                    <p:cTn id="7" fill="hold">
+                      <p:stCondLst>
+                        <p:cond delay="indefinite"/>
+                      </p:stCondLst>
+                      <p:childTnLst>
+                        <p:par>
+                          <p:cTn id="8" fill="hold">
+                            <p:stCondLst>
+                              <p:cond delay="0"/>
+                            </p:stCondLst>
+                            <p:childTnLst>
+                              <p:par>
+                                <p:cTn id="9" presetID="1" presetClass="entr" presetSubtype="0" fill="hold" grpId="0" nodeType="clickEffect">
+                                  <p:stCondLst>
+                                    <p:cond delay="0"/>
+                                  </p:stCondLst>
+                                  <p:childTnLst>
+                                    <p:set>
+                                      <p:cBhvr>
+                                        <p:cTn id="10" dur="1" fill="hold">
+                                          <p:stCondLst>
+                                            <p:cond delay="0"/>
+                                          </p:stCondLst>
+                                        </p:cTn>
+                                        <p:tgtEl>
+                                          <p:spTgt spid="5"/>
+                                        </p:tgtEl>
+                                        <p:attrNameLst>
+                                          <p:attrName>style.visibility</p:attrName>
+                                        </p:attrNameLst>
+                                      </p:cBhvr>
+                                      <p:to>
+                                        <p:strVal val="visible"/>
+                                      </p:to>
+                                    </p:set>
+                                  </p:childTnLst>
+                                </p:cTn>
+                              </p:par>
+                            </p:childTnLst>
+                          </p:cTn>
+                        </p:par>
+                      </p:childTnLst>
+                    </p:cTn>
+                  </p:par>
                 </p:childTnLst>
               </p:cTn>
               <p:prevCondLst>
@@ -6308,6 +6391,9 @@
         </p:cTn>
       </p:par>
     </p:tnLst>
+    <p:bldLst>
+      <p:bldP spid="5" grpId="0"/>
+    </p:bldLst>
   </p:timing>
 </p:sld>
 </file>

</xml_diff>

<commit_message>
Updated syllabus with stats notebooks and video links.
</commit_message>
<xml_diff>
--- a/Wi19_content/DSMCER/L3_Descriptive_Statistics.pptx
+++ b/Wi19_content/DSMCER/L3_Descriptive_Statistics.pptx
@@ -246,7 +246,7 @@
           <a:p>
             <a:fld id="{08F62E20-B1AA-3442-B8F1-F4A56998389D}" type="datetimeFigureOut">
               <a:rPr lang="en-US" smtClean="0"/>
-              <a:t>1/24/2019</a:t>
+              <a:t>1/29/2019</a:t>
             </a:fld>
             <a:endParaRPr lang="en-US"/>
           </a:p>
@@ -2234,7 +2234,7 @@
           <a:p>
             <a:fld id="{2691D6E4-0F7A-0249-86EF-226720E50E4C}" type="datetimeFigureOut">
               <a:rPr lang="en-US" smtClean="0"/>
-              <a:t>1/24/2019</a:t>
+              <a:t>1/29/2019</a:t>
             </a:fld>
             <a:endParaRPr lang="en-US"/>
           </a:p>
@@ -2426,7 +2426,7 @@
           <a:p>
             <a:fld id="{2691D6E4-0F7A-0249-86EF-226720E50E4C}" type="datetimeFigureOut">
               <a:rPr lang="en-US" smtClean="0"/>
-              <a:t>1/24/2019</a:t>
+              <a:t>1/29/2019</a:t>
             </a:fld>
             <a:endParaRPr lang="en-US"/>
           </a:p>
@@ -2628,7 +2628,7 @@
           <a:p>
             <a:fld id="{2691D6E4-0F7A-0249-86EF-226720E50E4C}" type="datetimeFigureOut">
               <a:rPr lang="en-US" smtClean="0"/>
-              <a:t>1/24/2019</a:t>
+              <a:t>1/29/2019</a:t>
             </a:fld>
             <a:endParaRPr lang="en-US"/>
           </a:p>
@@ -2820,7 +2820,7 @@
           <a:p>
             <a:fld id="{2691D6E4-0F7A-0249-86EF-226720E50E4C}" type="datetimeFigureOut">
               <a:rPr lang="en-US" smtClean="0"/>
-              <a:t>1/24/2019</a:t>
+              <a:t>1/29/2019</a:t>
             </a:fld>
             <a:endParaRPr lang="en-US"/>
           </a:p>
@@ -3089,7 +3089,7 @@
           <a:p>
             <a:fld id="{2691D6E4-0F7A-0249-86EF-226720E50E4C}" type="datetimeFigureOut">
               <a:rPr lang="en-US" smtClean="0"/>
-              <a:t>1/24/2019</a:t>
+              <a:t>1/29/2019</a:t>
             </a:fld>
             <a:endParaRPr lang="en-US"/>
           </a:p>
@@ -3398,7 +3398,7 @@
           <a:p>
             <a:fld id="{2691D6E4-0F7A-0249-86EF-226720E50E4C}" type="datetimeFigureOut">
               <a:rPr lang="en-US" smtClean="0"/>
-              <a:t>1/24/2019</a:t>
+              <a:t>1/29/2019</a:t>
             </a:fld>
             <a:endParaRPr lang="en-US"/>
           </a:p>
@@ -3841,7 +3841,7 @@
           <a:p>
             <a:fld id="{2691D6E4-0F7A-0249-86EF-226720E50E4C}" type="datetimeFigureOut">
               <a:rPr lang="en-US" smtClean="0"/>
-              <a:t>1/24/2019</a:t>
+              <a:t>1/29/2019</a:t>
             </a:fld>
             <a:endParaRPr lang="en-US"/>
           </a:p>
@@ -3982,7 +3982,7 @@
           <a:p>
             <a:fld id="{2691D6E4-0F7A-0249-86EF-226720E50E4C}" type="datetimeFigureOut">
               <a:rPr lang="en-US" smtClean="0"/>
-              <a:t>1/24/2019</a:t>
+              <a:t>1/29/2019</a:t>
             </a:fld>
             <a:endParaRPr lang="en-US"/>
           </a:p>
@@ -4101,7 +4101,7 @@
           <a:p>
             <a:fld id="{2691D6E4-0F7A-0249-86EF-226720E50E4C}" type="datetimeFigureOut">
               <a:rPr lang="en-US" smtClean="0"/>
-              <a:t>1/24/2019</a:t>
+              <a:t>1/29/2019</a:t>
             </a:fld>
             <a:endParaRPr lang="en-US"/>
           </a:p>
@@ -4400,7 +4400,7 @@
           <a:p>
             <a:fld id="{2691D6E4-0F7A-0249-86EF-226720E50E4C}" type="datetimeFigureOut">
               <a:rPr lang="en-US" smtClean="0"/>
-              <a:t>1/24/2019</a:t>
+              <a:t>1/29/2019</a:t>
             </a:fld>
             <a:endParaRPr lang="en-US"/>
           </a:p>
@@ -4676,7 +4676,7 @@
           <a:p>
             <a:fld id="{2691D6E4-0F7A-0249-86EF-226720E50E4C}" type="datetimeFigureOut">
               <a:rPr lang="en-US" smtClean="0"/>
-              <a:t>1/24/2019</a:t>
+              <a:t>1/29/2019</a:t>
             </a:fld>
             <a:endParaRPr lang="en-US"/>
           </a:p>
@@ -6399,7 +6399,7 @@
 </file>
 
 <file path=ppt/slides/slide13.xml><?xml version="1.0" encoding="utf-8"?>
-<p:sld xmlns:a="http://schemas.openxmlformats.org/drawingml/2006/main" xmlns:r="http://schemas.openxmlformats.org/officeDocument/2006/relationships" xmlns:p="http://schemas.openxmlformats.org/presentationml/2006/main">
+<p:sld xmlns:a="http://schemas.openxmlformats.org/drawingml/2006/main" xmlns:r="http://schemas.openxmlformats.org/officeDocument/2006/relationships" xmlns:p="http://schemas.openxmlformats.org/presentationml/2006/main" show="0">
   <p:cSld>
     <p:spTree>
       <p:nvGrpSpPr>
@@ -6660,7 +6660,7 @@
 </file>
 
 <file path=ppt/slides/slide14.xml><?xml version="1.0" encoding="utf-8"?>
-<p:sld xmlns:a="http://schemas.openxmlformats.org/drawingml/2006/main" xmlns:r="http://schemas.openxmlformats.org/officeDocument/2006/relationships" xmlns:p="http://schemas.openxmlformats.org/presentationml/2006/main">
+<p:sld xmlns:a="http://schemas.openxmlformats.org/drawingml/2006/main" xmlns:r="http://schemas.openxmlformats.org/officeDocument/2006/relationships" xmlns:p="http://schemas.openxmlformats.org/presentationml/2006/main" show="0">
   <p:cSld>
     <p:spTree>
       <p:nvGrpSpPr>
@@ -7651,7 +7651,7 @@
 </file>
 
 <file path=ppt/slides/slide17.xml><?xml version="1.0" encoding="utf-8"?>
-<p:sld xmlns:a="http://schemas.openxmlformats.org/drawingml/2006/main" xmlns:r="http://schemas.openxmlformats.org/officeDocument/2006/relationships" xmlns:p="http://schemas.openxmlformats.org/presentationml/2006/main">
+<p:sld xmlns:a="http://schemas.openxmlformats.org/drawingml/2006/main" xmlns:r="http://schemas.openxmlformats.org/officeDocument/2006/relationships" xmlns:p="http://schemas.openxmlformats.org/presentationml/2006/main" show="0">
   <p:cSld>
     <p:spTree>
       <p:nvGrpSpPr>

</xml_diff>